<commit_message>
Fix Booking Sequence Diagram
</commit_message>
<xml_diff>
--- a/SRS.pptx
+++ b/SRS.pptx
@@ -252,7 +252,7 @@
           <a:p>
             <a:fld id="{A8F663A5-96E6-074D-A5C6-54FAFA8E38E3}" type="datetimeFigureOut">
               <a:rPr lang="en-TH" smtClean="0"/>
-              <a:t>26/4/2024 R</a:t>
+              <a:t>04/26/2024</a:t>
             </a:fld>
             <a:endParaRPr lang="en-TH"/>
           </a:p>
@@ -753,7 +753,7 @@
           <a:p>
             <a:fld id="{4CA0208E-FA34-6B45-9954-6E21D5F04D20}" type="datetime1">
               <a:rPr lang="en-US" smtClean="0"/>
-              <a:t>4/26/24</a:t>
+              <a:t>4/26/2024</a:t>
             </a:fld>
             <a:endParaRPr lang="en-TH"/>
           </a:p>
@@ -953,7 +953,7 @@
           <a:p>
             <a:fld id="{C7DCB651-D476-EC43-A51B-CB8E865D4974}" type="datetime1">
               <a:rPr lang="en-US" smtClean="0"/>
-              <a:t>4/26/24</a:t>
+              <a:t>4/26/2024</a:t>
             </a:fld>
             <a:endParaRPr lang="en-TH"/>
           </a:p>
@@ -1163,7 +1163,7 @@
           <a:p>
             <a:fld id="{624015C3-8D8F-C14E-9662-DE2912D274F4}" type="datetime1">
               <a:rPr lang="en-US" smtClean="0"/>
-              <a:t>4/26/24</a:t>
+              <a:t>4/26/2024</a:t>
             </a:fld>
             <a:endParaRPr lang="en-TH"/>
           </a:p>
@@ -1363,7 +1363,7 @@
           <a:p>
             <a:fld id="{628CE1A5-DDED-3E41-A0AC-24453BDAED8A}" type="datetime1">
               <a:rPr lang="en-US" smtClean="0"/>
-              <a:t>4/26/24</a:t>
+              <a:t>4/26/2024</a:t>
             </a:fld>
             <a:endParaRPr lang="en-TH"/>
           </a:p>
@@ -1639,7 +1639,7 @@
           <a:p>
             <a:fld id="{32973487-8A5B-0940-9610-819AC6975803}" type="datetime1">
               <a:rPr lang="en-US" smtClean="0"/>
-              <a:t>4/26/24</a:t>
+              <a:t>4/26/2024</a:t>
             </a:fld>
             <a:endParaRPr lang="en-TH"/>
           </a:p>
@@ -1907,7 +1907,7 @@
           <a:p>
             <a:fld id="{F28B86B7-3FCD-5947-A26C-C7D909825C38}" type="datetime1">
               <a:rPr lang="en-US" smtClean="0"/>
-              <a:t>4/26/24</a:t>
+              <a:t>4/26/2024</a:t>
             </a:fld>
             <a:endParaRPr lang="en-TH"/>
           </a:p>
@@ -2322,7 +2322,7 @@
           <a:p>
             <a:fld id="{DFBBAAC6-B185-5D48-B655-D39603FF8859}" type="datetime1">
               <a:rPr lang="en-US" smtClean="0"/>
-              <a:t>4/26/24</a:t>
+              <a:t>4/26/2024</a:t>
             </a:fld>
             <a:endParaRPr lang="en-TH"/>
           </a:p>
@@ -2464,7 +2464,7 @@
           <a:p>
             <a:fld id="{1DBA733C-2830-7846-8911-B0D4E9C1F27D}" type="datetime1">
               <a:rPr lang="en-US" smtClean="0"/>
-              <a:t>4/26/24</a:t>
+              <a:t>4/26/2024</a:t>
             </a:fld>
             <a:endParaRPr lang="en-TH"/>
           </a:p>
@@ -2577,7 +2577,7 @@
           <a:p>
             <a:fld id="{F1155A01-14CE-EF46-90A0-A001A6951EBC}" type="datetime1">
               <a:rPr lang="en-US" smtClean="0"/>
-              <a:t>4/26/24</a:t>
+              <a:t>4/26/2024</a:t>
             </a:fld>
             <a:endParaRPr lang="en-TH"/>
           </a:p>
@@ -2890,7 +2890,7 @@
           <a:p>
             <a:fld id="{97F60A24-DF3C-AA44-9B74-B906C2FC9FAD}" type="datetime1">
               <a:rPr lang="en-US" smtClean="0"/>
-              <a:t>4/26/24</a:t>
+              <a:t>4/26/2024</a:t>
             </a:fld>
             <a:endParaRPr lang="en-TH"/>
           </a:p>
@@ -3179,7 +3179,7 @@
           <a:p>
             <a:fld id="{6ED809D9-8345-3A4B-B780-36EA8BFF8139}" type="datetime1">
               <a:rPr lang="en-US" smtClean="0"/>
-              <a:t>4/26/24</a:t>
+              <a:t>4/26/2024</a:t>
             </a:fld>
             <a:endParaRPr lang="en-TH"/>
           </a:p>
@@ -3425,7 +3425,7 @@
             <a:fld id="{F99546A2-6E03-9547-9AFE-0DE96DDCBD90}" type="datetime1">
               <a:rPr lang="en-US" smtClean="0"/>
               <a:pPr/>
-              <a:t>4/26/24</a:t>
+              <a:t>4/26/2024</a:t>
             </a:fld>
             <a:endParaRPr lang="en-TH"/>
           </a:p>
@@ -7697,9 +7697,17 @@
             </a:r>
           </a:p>
           <a:p>
-            <a:pPr marL="0" indent="0">
-              <a:buNone/>
-            </a:pPr>
+            <a:r>
+              <a:rPr lang="th-TH" dirty="0"/>
+              <a:t>แก้จาก </a:t>
+            </a:r>
+            <a:r>
+              <a:rPr lang="en-US" dirty="0"/>
+              <a:t>Appointment -&gt; Booking</a:t>
+            </a:r>
+            <a:endParaRPr lang="en-TH" dirty="0"/>
+          </a:p>
+          <a:p>
             <a:endParaRPr lang="en-TH" dirty="0"/>
           </a:p>
           <a:p>

</xml_diff>